<commit_message>
Battle of Neighborhood presentation
</commit_message>
<xml_diff>
--- a/BattleOfNeighborhoodPPT.pptx
+++ b/BattleOfNeighborhoodPPT.pptx
@@ -123,6 +123,11 @@
       </a:defRPr>
     </a:lvl9pPr>
   </p:defaultTextStyle>
+  <p:extLst>
+    <p:ext uri="{EFAFB233-063F-42B5-8137-9DF3F51BA10A}">
+      <p15:sldGuideLst xmlns:p15="http://schemas.microsoft.com/office/powerpoint/2012/main"/>
+    </p:ext>
+  </p:extLst>
 </p:presentation>
 </file>
 
@@ -4316,7 +4321,6 @@
               <a:rPr lang="en-US" dirty="0"/>
               <a:t> Battle of Neighborhood</a:t>
             </a:r>
-            <a:endParaRPr lang="en-US" dirty="0"/>
           </a:p>
         </p:txBody>
       </p:sp>
@@ -4696,7 +4700,6 @@
               <a:rPr lang="en-US" dirty="0"/>
               <a:t>Methodology</a:t>
             </a:r>
-            <a:endParaRPr lang="en-US" dirty="0"/>
           </a:p>
         </p:txBody>
       </p:sp>
@@ -4854,7 +4857,6 @@
               <a:rPr lang="en-US" dirty="0"/>
               <a:t>Analyze Cluster 1</a:t>
             </a:r>
-            <a:endParaRPr lang="en-US" dirty="0"/>
           </a:p>
         </p:txBody>
       </p:sp>
@@ -4890,7 +4892,15 @@
             </a:r>
             <a:r>
               <a:rPr lang="en-US" dirty="0"/>
-              <a:t>we look into the cluster 5, we find that in this cluster the Home Price is on lower </a:t>
+              <a:t>we look into the cluster </a:t>
+            </a:r>
+            <a:r>
+              <a:rPr lang="en-US" dirty="0" smtClean="0"/>
+              <a:t>1, </a:t>
+            </a:r>
+            <a:r>
+              <a:rPr lang="en-US" dirty="0"/>
+              <a:t>we find that in this cluster the Home Price is on lower </a:t>
             </a:r>
             <a:r>
               <a:rPr lang="en-US" dirty="0" smtClean="0"/>
@@ -4930,7 +4940,6 @@
               <a:rPr lang="en-US" dirty="0"/>
               <a:t>of Venues in neighborhoods are also lower.</a:t>
             </a:r>
-            <a:endParaRPr lang="en-US" dirty="0"/>
           </a:p>
         </p:txBody>
       </p:sp>
@@ -5168,7 +5177,15 @@
           <a:p>
             <a:r>
               <a:rPr lang="en-US" dirty="0"/>
-              <a:t>•When we examine cluster 2, we find that in this cluster, the home price is on lower side except Memorial Villages, Crime rate is lower except </a:t>
+              <a:t>•When we examine cluster </a:t>
+            </a:r>
+            <a:r>
+              <a:rPr lang="en-US" dirty="0" smtClean="0"/>
+              <a:t>3, </a:t>
+            </a:r>
+            <a:r>
+              <a:rPr lang="en-US" dirty="0"/>
+              <a:t>we find that in this cluster, the home price is on lower side except Memorial Villages, Crime rate is lower except </a:t>
             </a:r>
             <a:r>
               <a:rPr lang="en-US" dirty="0" err="1"/>
@@ -5473,7 +5490,15 @@
           <a:p>
             <a:r>
               <a:rPr lang="en-US" dirty="0"/>
-              <a:t>•When we examine cluster 3, we find that in this cluster, the home prices are on relatively reasonable side, Crime rate is average. School ratings are high except Upper Kirby. These neighborhoods have many venues for different activities.</a:t>
+              <a:t>•When we examine cluster </a:t>
+            </a:r>
+            <a:r>
+              <a:rPr lang="en-US" dirty="0" smtClean="0"/>
+              <a:t>5, </a:t>
+            </a:r>
+            <a:r>
+              <a:rPr lang="en-US" dirty="0"/>
+              <a:t>we find that in this cluster, the home prices are on relatively reasonable side, Crime rate is average. School ratings are high except Upper Kirby. These neighborhoods have many venues for different activities.</a:t>
             </a:r>
           </a:p>
           <a:p>
@@ -5569,7 +5594,6 @@
               <a:rPr lang="en-US" dirty="0"/>
               <a:t>Results and Discussion</a:t>
             </a:r>
-            <a:endParaRPr lang="en-US" dirty="0"/>
           </a:p>
         </p:txBody>
       </p:sp>
@@ -5815,7 +5839,6 @@
               <a:rPr lang="en-US" dirty="0"/>
               <a:t>Business Problem</a:t>
             </a:r>
-            <a:endParaRPr lang="en-US" dirty="0"/>
           </a:p>
         </p:txBody>
       </p:sp>
@@ -6153,7 +6176,6 @@
               <a:rPr lang="en-US" dirty="0"/>
               <a:t>the page using BeautifulSuop4 Library</a:t>
             </a:r>
-            <a:endParaRPr lang="en-US" dirty="0"/>
           </a:p>
         </p:txBody>
       </p:sp>
@@ -6239,7 +6261,6 @@
               <a:rPr lang="en-US" dirty="0"/>
               <a:t>Crime Data</a:t>
             </a:r>
-            <a:endParaRPr lang="en-US" dirty="0"/>
           </a:p>
         </p:txBody>
       </p:sp>
@@ -6314,7 +6335,6 @@
               <a:rPr lang="en-US" dirty="0"/>
               <a:t>Excel </a:t>
             </a:r>
-            <a:endParaRPr lang="en-US" dirty="0"/>
           </a:p>
         </p:txBody>
       </p:sp>
@@ -6400,7 +6420,6 @@
               <a:rPr lang="en-US" dirty="0"/>
               <a:t>School Accountability Ratings </a:t>
             </a:r>
-            <a:endParaRPr lang="en-US" dirty="0"/>
           </a:p>
         </p:txBody>
       </p:sp>
@@ -6482,7 +6501,6 @@
               <a:rPr lang="en-US" dirty="0"/>
               <a:t> code</a:t>
             </a:r>
-            <a:endParaRPr lang="en-US" dirty="0"/>
           </a:p>
         </p:txBody>
       </p:sp>
@@ -6568,7 +6586,6 @@
               <a:rPr lang="en-US" dirty="0"/>
               <a:t>Latitude and Longitudes of Zip Codes</a:t>
             </a:r>
-            <a:endParaRPr lang="en-US" dirty="0"/>
           </a:p>
         </p:txBody>
       </p:sp>
@@ -6641,7 +6658,6 @@
               <a:rPr lang="en-US" dirty="0"/>
               <a:t>Read CSV then filter for Houston City </a:t>
             </a:r>
-            <a:endParaRPr lang="en-US" dirty="0"/>
           </a:p>
         </p:txBody>
       </p:sp>
@@ -6727,7 +6743,6 @@
               <a:rPr lang="en-US" dirty="0"/>
               <a:t>Venues</a:t>
             </a:r>
-            <a:endParaRPr lang="en-US" dirty="0"/>
           </a:p>
         </p:txBody>
       </p:sp>
@@ -6794,7 +6809,6 @@
               <a:rPr lang="en-US" dirty="0"/>
               <a:t>Count the venues in the zip code</a:t>
             </a:r>
-            <a:endParaRPr lang="en-US" dirty="0"/>
           </a:p>
         </p:txBody>
       </p:sp>
@@ -6880,7 +6894,6 @@
               <a:rPr lang="en-US" dirty="0"/>
               <a:t>Final Dataset</a:t>
             </a:r>
-            <a:endParaRPr lang="en-US" dirty="0"/>
           </a:p>
         </p:txBody>
       </p:sp>

</xml_diff>